<commit_message>
fixed preschool priority statement in policies and procedures
</commit_message>
<xml_diff>
--- a/ActiveNet Trainer/Courses/ActiveNet Orientation - Enrollment/Enrollment Policies and Procedures.pptx
+++ b/ActiveNet Trainer/Courses/ActiveNet Orientation - Enrollment/Enrollment Policies and Procedures.pptx
@@ -5135,7 +5135,7 @@
           <a:p>
             <a:fld id="{8472C7DE-940F-F84D-87FC-CB6C77FFB87A}" type="datetimeFigureOut">
               <a:rPr lang="en-US" smtClean="0"/>
-              <a:t>12/21/16</a:t>
+              <a:t>1/4/17</a:t>
             </a:fld>
             <a:endParaRPr lang="en-US"/>
           </a:p>
@@ -5305,7 +5305,7 @@
           <a:p>
             <a:fld id="{8472C7DE-940F-F84D-87FC-CB6C77FFB87A}" type="datetimeFigureOut">
               <a:rPr lang="en-US" smtClean="0"/>
-              <a:t>12/21/16</a:t>
+              <a:t>1/4/17</a:t>
             </a:fld>
             <a:endParaRPr lang="en-US"/>
           </a:p>
@@ -5485,7 +5485,7 @@
           <a:p>
             <a:fld id="{8472C7DE-940F-F84D-87FC-CB6C77FFB87A}" type="datetimeFigureOut">
               <a:rPr lang="en-US" smtClean="0"/>
-              <a:t>12/21/16</a:t>
+              <a:t>1/4/17</a:t>
             </a:fld>
             <a:endParaRPr lang="en-US"/>
           </a:p>
@@ -5655,7 +5655,7 @@
           <a:p>
             <a:fld id="{8472C7DE-940F-F84D-87FC-CB6C77FFB87A}" type="datetimeFigureOut">
               <a:rPr lang="en-US" smtClean="0"/>
-              <a:t>12/21/16</a:t>
+              <a:t>1/4/17</a:t>
             </a:fld>
             <a:endParaRPr lang="en-US"/>
           </a:p>
@@ -5899,7 +5899,7 @@
           <a:p>
             <a:fld id="{8472C7DE-940F-F84D-87FC-CB6C77FFB87A}" type="datetimeFigureOut">
               <a:rPr lang="en-US" smtClean="0"/>
-              <a:t>12/21/16</a:t>
+              <a:t>1/4/17</a:t>
             </a:fld>
             <a:endParaRPr lang="en-US"/>
           </a:p>
@@ -6131,7 +6131,7 @@
           <a:p>
             <a:fld id="{8472C7DE-940F-F84D-87FC-CB6C77FFB87A}" type="datetimeFigureOut">
               <a:rPr lang="en-US" smtClean="0"/>
-              <a:t>12/21/16</a:t>
+              <a:t>1/4/17</a:t>
             </a:fld>
             <a:endParaRPr lang="en-US"/>
           </a:p>
@@ -6498,7 +6498,7 @@
           <a:p>
             <a:fld id="{8472C7DE-940F-F84D-87FC-CB6C77FFB87A}" type="datetimeFigureOut">
               <a:rPr lang="en-US" smtClean="0"/>
-              <a:t>12/21/16</a:t>
+              <a:t>1/4/17</a:t>
             </a:fld>
             <a:endParaRPr lang="en-US"/>
           </a:p>
@@ -6616,7 +6616,7 @@
           <a:p>
             <a:fld id="{8472C7DE-940F-F84D-87FC-CB6C77FFB87A}" type="datetimeFigureOut">
               <a:rPr lang="en-US" smtClean="0"/>
-              <a:t>12/21/16</a:t>
+              <a:t>1/4/17</a:t>
             </a:fld>
             <a:endParaRPr lang="en-US"/>
           </a:p>
@@ -6711,7 +6711,7 @@
           <a:p>
             <a:fld id="{8472C7DE-940F-F84D-87FC-CB6C77FFB87A}" type="datetimeFigureOut">
               <a:rPr lang="en-US" smtClean="0"/>
-              <a:t>12/21/16</a:t>
+              <a:t>1/4/17</a:t>
             </a:fld>
             <a:endParaRPr lang="en-US"/>
           </a:p>
@@ -6988,7 +6988,7 @@
           <a:p>
             <a:fld id="{8472C7DE-940F-F84D-87FC-CB6C77FFB87A}" type="datetimeFigureOut">
               <a:rPr lang="en-US" smtClean="0"/>
-              <a:t>12/21/16</a:t>
+              <a:t>1/4/17</a:t>
             </a:fld>
             <a:endParaRPr lang="en-US"/>
           </a:p>
@@ -7245,7 +7245,7 @@
           <a:p>
             <a:fld id="{8472C7DE-940F-F84D-87FC-CB6C77FFB87A}" type="datetimeFigureOut">
               <a:rPr lang="en-US" smtClean="0"/>
-              <a:t>12/21/16</a:t>
+              <a:t>1/4/17</a:t>
             </a:fld>
             <a:endParaRPr lang="en-US"/>
           </a:p>
@@ -7458,7 +7458,7 @@
           <a:p>
             <a:fld id="{8472C7DE-940F-F84D-87FC-CB6C77FFB87A}" type="datetimeFigureOut">
               <a:rPr lang="en-US" smtClean="0"/>
-              <a:t>12/21/16</a:t>
+              <a:t>1/4/17</a:t>
             </a:fld>
             <a:endParaRPr lang="en-US"/>
           </a:p>
@@ -9569,7 +9569,23 @@
                     <a:schemeClr val="tx1"/>
                   </a:solidFill>
                 </a:rPr>
-                <a:t>Those currently enrolled in preschool have up until a week prior to the next class for priority registration; Registration opens to the public the week of the last session.</a:t>
+                <a:t>Those currently enrolled in preschool have up until a week prior to the next class for priority registration; Registration opens to the public </a:t>
+              </a:r>
+              <a:r>
+                <a:rPr lang="en-US" sz="1100" dirty="0" smtClean="0">
+                  <a:solidFill>
+                    <a:schemeClr val="tx1"/>
+                  </a:solidFill>
+                </a:rPr>
+                <a:t>the last week of </a:t>
+              </a:r>
+              <a:r>
+                <a:rPr lang="en-US" sz="1100" smtClean="0">
+                  <a:solidFill>
+                    <a:schemeClr val="tx1"/>
+                  </a:solidFill>
+                </a:rPr>
+                <a:t>the session.</a:t>
               </a:r>
               <a:endParaRPr lang="en-US" sz="1100" dirty="0">
                 <a:solidFill>

</xml_diff>